<commit_message>
added updates after main net
added updates after main net achieved
</commit_message>
<xml_diff>
--- a/ETHBackpack.pptx
+++ b/ETHBackpack.pptx
@@ -5,7 +5,7 @@
     <p:sldMasterId id="2147483648" r:id="rId1"/>
   </p:sldMasterIdLst>
   <p:notesMasterIdLst>
-    <p:notesMasterId r:id="rId10"/>
+    <p:notesMasterId r:id="rId11"/>
   </p:notesMasterIdLst>
   <p:sldIdLst>
     <p:sldId id="256" r:id="rId2"/>
@@ -14,8 +14,9 @@
     <p:sldId id="264" r:id="rId5"/>
     <p:sldId id="267" r:id="rId6"/>
     <p:sldId id="260" r:id="rId7"/>
-    <p:sldId id="261" r:id="rId8"/>
-    <p:sldId id="266" r:id="rId9"/>
+    <p:sldId id="268" r:id="rId8"/>
+    <p:sldId id="261" r:id="rId9"/>
+    <p:sldId id="266" r:id="rId10"/>
   </p:sldIdLst>
   <p:sldSz cx="12192000" cy="6858000"/>
   <p:notesSz cx="6858000" cy="9144000"/>
@@ -114,6 +115,11 @@
       </a:defRPr>
     </a:lvl9pPr>
   </p:defaultTextStyle>
+  <p:extLst>
+    <p:ext uri="{EFAFB233-063F-42B5-8137-9DF3F51BA10A}">
+      <p15:sldGuideLst xmlns:p15="http://schemas.microsoft.com/office/powerpoint/2012/main"/>
+    </p:ext>
+  </p:extLst>
 </p:presentation>
 </file>
 
@@ -635,7 +641,7 @@
           <a:noFill/>
           <a:extLst>
             <a:ext uri="{909E8E84-426E-40dd-AFC4-6F175D3DCCD1}">
-              <a14:hiddenFill xmlns:a14="http://schemas.microsoft.com/office/drawing/2010/main" xmlns="">
+              <a14:hiddenFill xmlns="" xmlns:a14="http://schemas.microsoft.com/office/drawing/2010/main">
                 <a:solidFill>
                   <a:srgbClr val="FFFFFF"/>
                 </a:solidFill>
@@ -695,7 +701,7 @@
             </a:ln>
             <a:extLst>
               <a:ext uri="{91240B29-F687-4f45-9708-019B960494DF}">
-                <a14:hiddenLine xmlns:a14="http://schemas.microsoft.com/office/drawing/2010/main" xmlns="" w="9525">
+                <a14:hiddenLine xmlns="" xmlns:a14="http://schemas.microsoft.com/office/drawing/2010/main" w="9525">
                   <a:solidFill>
                     <a:srgbClr val="000000"/>
                   </a:solidFill>
@@ -785,7 +791,7 @@
             </a:ln>
             <a:extLst>
               <a:ext uri="{91240B29-F687-4f45-9708-019B960494DF}">
-                <a14:hiddenLine xmlns:a14="http://schemas.microsoft.com/office/drawing/2010/main" xmlns="" w="9525">
+                <a14:hiddenLine xmlns="" xmlns:a14="http://schemas.microsoft.com/office/drawing/2010/main" w="9525">
                   <a:solidFill>
                     <a:srgbClr val="000000"/>
                   </a:solidFill>
@@ -875,7 +881,7 @@
             </a:ln>
             <a:extLst>
               <a:ext uri="{91240B29-F687-4f45-9708-019B960494DF}">
-                <a14:hiddenLine xmlns:a14="http://schemas.microsoft.com/office/drawing/2010/main" xmlns="" w="9525">
+                <a14:hiddenLine xmlns="" xmlns:a14="http://schemas.microsoft.com/office/drawing/2010/main" w="9525">
                   <a:solidFill>
                     <a:srgbClr val="000000"/>
                   </a:solidFill>
@@ -909,7 +915,7 @@
             </a:ln>
             <a:extLst>
               <a:ext uri="{91240B29-F687-4f45-9708-019B960494DF}">
-                <a14:hiddenLine xmlns:a14="http://schemas.microsoft.com/office/drawing/2010/main" xmlns="" w="9525">
+                <a14:hiddenLine xmlns="" xmlns:a14="http://schemas.microsoft.com/office/drawing/2010/main" w="9525">
                   <a:solidFill>
                     <a:srgbClr val="000000"/>
                   </a:solidFill>
@@ -999,7 +1005,7 @@
             </a:ln>
             <a:extLst>
               <a:ext uri="{91240B29-F687-4f45-9708-019B960494DF}">
-                <a14:hiddenLine xmlns:a14="http://schemas.microsoft.com/office/drawing/2010/main" xmlns="" w="9525">
+                <a14:hiddenLine xmlns="" xmlns:a14="http://schemas.microsoft.com/office/drawing/2010/main" w="9525">
                   <a:solidFill>
                     <a:srgbClr val="000000"/>
                   </a:solidFill>
@@ -1061,7 +1067,7 @@
             </a:ln>
             <a:extLst>
               <a:ext uri="{91240B29-F687-4f45-9708-019B960494DF}">
-                <a14:hiddenLine xmlns:a14="http://schemas.microsoft.com/office/drawing/2010/main" xmlns="" w="9525">
+                <a14:hiddenLine xmlns="" xmlns:a14="http://schemas.microsoft.com/office/drawing/2010/main" w="9525">
                   <a:solidFill>
                     <a:srgbClr val="000000"/>
                   </a:solidFill>
@@ -1123,7 +1129,7 @@
             </a:ln>
             <a:extLst>
               <a:ext uri="{91240B29-F687-4f45-9708-019B960494DF}">
-                <a14:hiddenLine xmlns:a14="http://schemas.microsoft.com/office/drawing/2010/main" xmlns="" w="9525">
+                <a14:hiddenLine xmlns="" xmlns:a14="http://schemas.microsoft.com/office/drawing/2010/main" w="9525">
                   <a:solidFill>
                     <a:srgbClr val="000000"/>
                   </a:solidFill>
@@ -1213,7 +1219,7 @@
             </a:ln>
             <a:extLst>
               <a:ext uri="{91240B29-F687-4f45-9708-019B960494DF}">
-                <a14:hiddenLine xmlns:a14="http://schemas.microsoft.com/office/drawing/2010/main" xmlns="" w="9525">
+                <a14:hiddenLine xmlns="" xmlns:a14="http://schemas.microsoft.com/office/drawing/2010/main" w="9525">
                   <a:solidFill>
                     <a:srgbClr val="000000"/>
                   </a:solidFill>
@@ -1275,7 +1281,7 @@
             </a:ln>
             <a:extLst>
               <a:ext uri="{91240B29-F687-4f45-9708-019B960494DF}">
-                <a14:hiddenLine xmlns:a14="http://schemas.microsoft.com/office/drawing/2010/main" xmlns="" w="9525">
+                <a14:hiddenLine xmlns="" xmlns:a14="http://schemas.microsoft.com/office/drawing/2010/main" w="9525">
                   <a:solidFill>
                     <a:srgbClr val="000000"/>
                   </a:solidFill>
@@ -1337,7 +1343,7 @@
             </a:ln>
             <a:extLst>
               <a:ext uri="{91240B29-F687-4f45-9708-019B960494DF}">
-                <a14:hiddenLine xmlns:a14="http://schemas.microsoft.com/office/drawing/2010/main" xmlns="" w="9525">
+                <a14:hiddenLine xmlns="" xmlns:a14="http://schemas.microsoft.com/office/drawing/2010/main" w="9525">
                   <a:solidFill>
                     <a:srgbClr val="000000"/>
                   </a:solidFill>
@@ -1427,7 +1433,7 @@
             </a:ln>
             <a:extLst>
               <a:ext uri="{91240B29-F687-4f45-9708-019B960494DF}">
-                <a14:hiddenLine xmlns:a14="http://schemas.microsoft.com/office/drawing/2010/main" xmlns="" w="9525">
+                <a14:hiddenLine xmlns="" xmlns:a14="http://schemas.microsoft.com/office/drawing/2010/main" w="9525">
                   <a:solidFill>
                     <a:srgbClr val="000000"/>
                   </a:solidFill>
@@ -1517,7 +1523,7 @@
             </a:ln>
             <a:extLst>
               <a:ext uri="{91240B29-F687-4f45-9708-019B960494DF}">
-                <a14:hiddenLine xmlns:a14="http://schemas.microsoft.com/office/drawing/2010/main" xmlns="" w="9525">
+                <a14:hiddenLine xmlns="" xmlns:a14="http://schemas.microsoft.com/office/drawing/2010/main" w="9525">
                   <a:solidFill>
                     <a:srgbClr val="000000"/>
                   </a:solidFill>
@@ -1579,7 +1585,7 @@
             </a:ln>
             <a:extLst>
               <a:ext uri="{91240B29-F687-4f45-9708-019B960494DF}">
-                <a14:hiddenLine xmlns:a14="http://schemas.microsoft.com/office/drawing/2010/main" xmlns="" w="9525">
+                <a14:hiddenLine xmlns="" xmlns:a14="http://schemas.microsoft.com/office/drawing/2010/main" w="9525">
                   <a:solidFill>
                     <a:srgbClr val="000000"/>
                   </a:solidFill>
@@ -1689,7 +1695,7 @@
             </a:ln>
             <a:extLst>
               <a:ext uri="{91240B29-F687-4f45-9708-019B960494DF}">
-                <a14:hiddenLine xmlns:a14="http://schemas.microsoft.com/office/drawing/2010/main" xmlns="" w="9525">
+                <a14:hiddenLine xmlns="" xmlns:a14="http://schemas.microsoft.com/office/drawing/2010/main" w="9525">
                   <a:solidFill>
                     <a:srgbClr val="000000"/>
                   </a:solidFill>
@@ -1751,7 +1757,7 @@
             </a:ln>
             <a:extLst>
               <a:ext uri="{91240B29-F687-4f45-9708-019B960494DF}">
-                <a14:hiddenLine xmlns:a14="http://schemas.microsoft.com/office/drawing/2010/main" xmlns="" w="9525">
+                <a14:hiddenLine xmlns="" xmlns:a14="http://schemas.microsoft.com/office/drawing/2010/main" w="9525">
                   <a:solidFill>
                     <a:srgbClr val="000000"/>
                   </a:solidFill>
@@ -1841,7 +1847,7 @@
             </a:ln>
             <a:extLst>
               <a:ext uri="{91240B29-F687-4f45-9708-019B960494DF}">
-                <a14:hiddenLine xmlns:a14="http://schemas.microsoft.com/office/drawing/2010/main" xmlns="" w="9525">
+                <a14:hiddenLine xmlns="" xmlns:a14="http://schemas.microsoft.com/office/drawing/2010/main" w="9525">
                   <a:solidFill>
                     <a:srgbClr val="000000"/>
                   </a:solidFill>
@@ -1931,7 +1937,7 @@
             </a:ln>
             <a:extLst>
               <a:ext uri="{91240B29-F687-4f45-9708-019B960494DF}">
-                <a14:hiddenLine xmlns:a14="http://schemas.microsoft.com/office/drawing/2010/main" xmlns="" w="9525">
+                <a14:hiddenLine xmlns="" xmlns:a14="http://schemas.microsoft.com/office/drawing/2010/main" w="9525">
                   <a:solidFill>
                     <a:srgbClr val="000000"/>
                   </a:solidFill>
@@ -1993,7 +1999,7 @@
             </a:ln>
             <a:extLst>
               <a:ext uri="{91240B29-F687-4f45-9708-019B960494DF}">
-                <a14:hiddenLine xmlns:a14="http://schemas.microsoft.com/office/drawing/2010/main" xmlns="" w="9525">
+                <a14:hiddenLine xmlns="" xmlns:a14="http://schemas.microsoft.com/office/drawing/2010/main" w="9525">
                   <a:solidFill>
                     <a:srgbClr val="000000"/>
                   </a:solidFill>
@@ -2083,7 +2089,7 @@
             </a:ln>
             <a:extLst>
               <a:ext uri="{91240B29-F687-4f45-9708-019B960494DF}">
-                <a14:hiddenLine xmlns:a14="http://schemas.microsoft.com/office/drawing/2010/main" xmlns="" w="9525">
+                <a14:hiddenLine xmlns="" xmlns:a14="http://schemas.microsoft.com/office/drawing/2010/main" w="9525">
                   <a:solidFill>
                     <a:srgbClr val="000000"/>
                   </a:solidFill>
@@ -2173,7 +2179,7 @@
             </a:ln>
             <a:extLst>
               <a:ext uri="{91240B29-F687-4f45-9708-019B960494DF}">
-                <a14:hiddenLine xmlns:a14="http://schemas.microsoft.com/office/drawing/2010/main" xmlns="" w="9525">
+                <a14:hiddenLine xmlns="" xmlns:a14="http://schemas.microsoft.com/office/drawing/2010/main" w="9525">
                   <a:solidFill>
                     <a:srgbClr val="000000"/>
                   </a:solidFill>
@@ -2229,7 +2235,7 @@
             </a:ln>
             <a:extLst>
               <a:ext uri="{91240B29-F687-4f45-9708-019B960494DF}">
-                <a14:hiddenLine xmlns:a14="http://schemas.microsoft.com/office/drawing/2010/main" xmlns="" w="9525">
+                <a14:hiddenLine xmlns="" xmlns:a14="http://schemas.microsoft.com/office/drawing/2010/main" w="9525">
                   <a:solidFill>
                     <a:srgbClr val="000000"/>
                   </a:solidFill>
@@ -2319,7 +2325,7 @@
             </a:ln>
             <a:extLst>
               <a:ext uri="{91240B29-F687-4f45-9708-019B960494DF}">
-                <a14:hiddenLine xmlns:a14="http://schemas.microsoft.com/office/drawing/2010/main" xmlns="" w="9525">
+                <a14:hiddenLine xmlns="" xmlns:a14="http://schemas.microsoft.com/office/drawing/2010/main" w="9525">
                   <a:solidFill>
                     <a:srgbClr val="000000"/>
                   </a:solidFill>
@@ -2375,7 +2381,7 @@
             </a:ln>
             <a:extLst>
               <a:ext uri="{91240B29-F687-4f45-9708-019B960494DF}">
-                <a14:hiddenLine xmlns:a14="http://schemas.microsoft.com/office/drawing/2010/main" xmlns="" w="9525">
+                <a14:hiddenLine xmlns="" xmlns:a14="http://schemas.microsoft.com/office/drawing/2010/main" w="9525">
                   <a:solidFill>
                     <a:srgbClr val="000000"/>
                   </a:solidFill>
@@ -2465,7 +2471,7 @@
             </a:ln>
             <a:extLst>
               <a:ext uri="{91240B29-F687-4f45-9708-019B960494DF}">
-                <a14:hiddenLine xmlns:a14="http://schemas.microsoft.com/office/drawing/2010/main" xmlns="" w="9525">
+                <a14:hiddenLine xmlns="" xmlns:a14="http://schemas.microsoft.com/office/drawing/2010/main" w="9525">
                   <a:solidFill>
                     <a:srgbClr val="000000"/>
                   </a:solidFill>
@@ -2533,7 +2539,7 @@
             </a:ln>
             <a:extLst>
               <a:ext uri="{91240B29-F687-4f45-9708-019B960494DF}">
-                <a14:hiddenLine xmlns:a14="http://schemas.microsoft.com/office/drawing/2010/main" xmlns="" w="9525">
+                <a14:hiddenLine xmlns="" xmlns:a14="http://schemas.microsoft.com/office/drawing/2010/main" w="9525">
                   <a:solidFill>
                     <a:srgbClr val="000000"/>
                   </a:solidFill>
@@ -2623,7 +2629,7 @@
             </a:ln>
             <a:extLst>
               <a:ext uri="{91240B29-F687-4f45-9708-019B960494DF}">
-                <a14:hiddenLine xmlns:a14="http://schemas.microsoft.com/office/drawing/2010/main" xmlns="" w="9525">
+                <a14:hiddenLine xmlns="" xmlns:a14="http://schemas.microsoft.com/office/drawing/2010/main" w="9525">
                   <a:solidFill>
                     <a:srgbClr val="000000"/>
                   </a:solidFill>
@@ -2691,7 +2697,7 @@
             </a:ln>
             <a:extLst>
               <a:ext uri="{91240B29-F687-4f45-9708-019B960494DF}">
-                <a14:hiddenLine xmlns:a14="http://schemas.microsoft.com/office/drawing/2010/main" xmlns="" w="9525">
+                <a14:hiddenLine xmlns="" xmlns:a14="http://schemas.microsoft.com/office/drawing/2010/main" w="9525">
                   <a:solidFill>
                     <a:srgbClr val="000000"/>
                   </a:solidFill>
@@ -2781,7 +2787,7 @@
             </a:ln>
             <a:extLst>
               <a:ext uri="{91240B29-F687-4f45-9708-019B960494DF}">
-                <a14:hiddenLine xmlns:a14="http://schemas.microsoft.com/office/drawing/2010/main" xmlns="" w="9525">
+                <a14:hiddenLine xmlns="" xmlns:a14="http://schemas.microsoft.com/office/drawing/2010/main" w="9525">
                   <a:solidFill>
                     <a:srgbClr val="000000"/>
                   </a:solidFill>
@@ -2815,7 +2821,7 @@
             </a:ln>
             <a:extLst>
               <a:ext uri="{91240B29-F687-4f45-9708-019B960494DF}">
-                <a14:hiddenLine xmlns:a14="http://schemas.microsoft.com/office/drawing/2010/main" xmlns="" w="9525">
+                <a14:hiddenLine xmlns="" xmlns:a14="http://schemas.microsoft.com/office/drawing/2010/main" w="9525">
                   <a:solidFill>
                     <a:srgbClr val="000000"/>
                   </a:solidFill>
@@ -2905,7 +2911,7 @@
             </a:ln>
             <a:extLst>
               <a:ext uri="{91240B29-F687-4f45-9708-019B960494DF}">
-                <a14:hiddenLine xmlns:a14="http://schemas.microsoft.com/office/drawing/2010/main" xmlns="" w="9525">
+                <a14:hiddenLine xmlns="" xmlns:a14="http://schemas.microsoft.com/office/drawing/2010/main" w="9525">
                   <a:solidFill>
                     <a:srgbClr val="000000"/>
                   </a:solidFill>
@@ -2967,7 +2973,7 @@
             </a:ln>
             <a:extLst>
               <a:ext uri="{91240B29-F687-4f45-9708-019B960494DF}">
-                <a14:hiddenLine xmlns:a14="http://schemas.microsoft.com/office/drawing/2010/main" xmlns="" w="9525">
+                <a14:hiddenLine xmlns="" xmlns:a14="http://schemas.microsoft.com/office/drawing/2010/main" w="9525">
                   <a:solidFill>
                     <a:srgbClr val="000000"/>
                   </a:solidFill>
@@ -3029,7 +3035,7 @@
             </a:ln>
             <a:extLst>
               <a:ext uri="{91240B29-F687-4f45-9708-019B960494DF}">
-                <a14:hiddenLine xmlns:a14="http://schemas.microsoft.com/office/drawing/2010/main" xmlns="" w="9525">
+                <a14:hiddenLine xmlns="" xmlns:a14="http://schemas.microsoft.com/office/drawing/2010/main" w="9525">
                   <a:solidFill>
                     <a:srgbClr val="000000"/>
                   </a:solidFill>
@@ -3119,7 +3125,7 @@
             </a:ln>
             <a:extLst>
               <a:ext uri="{91240B29-F687-4f45-9708-019B960494DF}">
-                <a14:hiddenLine xmlns:a14="http://schemas.microsoft.com/office/drawing/2010/main" xmlns="" w="9525">
+                <a14:hiddenLine xmlns="" xmlns:a14="http://schemas.microsoft.com/office/drawing/2010/main" w="9525">
                   <a:solidFill>
                     <a:srgbClr val="000000"/>
                   </a:solidFill>
@@ -3187,7 +3193,7 @@
             </a:ln>
             <a:extLst>
               <a:ext uri="{91240B29-F687-4f45-9708-019B960494DF}">
-                <a14:hiddenLine xmlns:a14="http://schemas.microsoft.com/office/drawing/2010/main" xmlns="" w="9525">
+                <a14:hiddenLine xmlns="" xmlns:a14="http://schemas.microsoft.com/office/drawing/2010/main" w="9525">
                   <a:solidFill>
                     <a:srgbClr val="000000"/>
                   </a:solidFill>
@@ -3249,7 +3255,7 @@
             </a:ln>
             <a:extLst>
               <a:ext uri="{91240B29-F687-4f45-9708-019B960494DF}">
-                <a14:hiddenLine xmlns:a14="http://schemas.microsoft.com/office/drawing/2010/main" xmlns="" w="9525">
+                <a14:hiddenLine xmlns="" xmlns:a14="http://schemas.microsoft.com/office/drawing/2010/main" w="9525">
                   <a:solidFill>
                     <a:srgbClr val="000000"/>
                   </a:solidFill>
@@ -3339,7 +3345,7 @@
             </a:ln>
             <a:extLst>
               <a:ext uri="{91240B29-F687-4f45-9708-019B960494DF}">
-                <a14:hiddenLine xmlns:a14="http://schemas.microsoft.com/office/drawing/2010/main" xmlns="" w="9525">
+                <a14:hiddenLine xmlns="" xmlns:a14="http://schemas.microsoft.com/office/drawing/2010/main" w="9525">
                   <a:solidFill>
                     <a:srgbClr val="000000"/>
                   </a:solidFill>
@@ -3401,7 +3407,7 @@
             </a:ln>
             <a:extLst>
               <a:ext uri="{91240B29-F687-4f45-9708-019B960494DF}">
-                <a14:hiddenLine xmlns:a14="http://schemas.microsoft.com/office/drawing/2010/main" xmlns="" w="9525">
+                <a14:hiddenLine xmlns="" xmlns:a14="http://schemas.microsoft.com/office/drawing/2010/main" w="9525">
                   <a:solidFill>
                     <a:srgbClr val="000000"/>
                   </a:solidFill>
@@ -3491,7 +3497,7 @@
             </a:ln>
             <a:extLst>
               <a:ext uri="{91240B29-F687-4f45-9708-019B960494DF}">
-                <a14:hiddenLine xmlns:a14="http://schemas.microsoft.com/office/drawing/2010/main" xmlns="" w="9525">
+                <a14:hiddenLine xmlns="" xmlns:a14="http://schemas.microsoft.com/office/drawing/2010/main" w="9525">
                   <a:solidFill>
                     <a:srgbClr val="000000"/>
                   </a:solidFill>
@@ -3553,7 +3559,7 @@
             </a:ln>
             <a:extLst>
               <a:ext uri="{91240B29-F687-4f45-9708-019B960494DF}">
-                <a14:hiddenLine xmlns:a14="http://schemas.microsoft.com/office/drawing/2010/main" xmlns="" w="9525">
+                <a14:hiddenLine xmlns="" xmlns:a14="http://schemas.microsoft.com/office/drawing/2010/main" w="9525">
                   <a:solidFill>
                     <a:srgbClr val="000000"/>
                   </a:solidFill>
@@ -3643,7 +3649,7 @@
             </a:ln>
             <a:extLst>
               <a:ext uri="{91240B29-F687-4f45-9708-019B960494DF}">
-                <a14:hiddenLine xmlns:a14="http://schemas.microsoft.com/office/drawing/2010/main" xmlns="" w="9525">
+                <a14:hiddenLine xmlns="" xmlns:a14="http://schemas.microsoft.com/office/drawing/2010/main" w="9525">
                   <a:solidFill>
                     <a:srgbClr val="000000"/>
                   </a:solidFill>
@@ -3677,7 +3683,7 @@
             </a:ln>
             <a:extLst>
               <a:ext uri="{91240B29-F687-4f45-9708-019B960494DF}">
-                <a14:hiddenLine xmlns:a14="http://schemas.microsoft.com/office/drawing/2010/main" xmlns="" w="9525">
+                <a14:hiddenLine xmlns="" xmlns:a14="http://schemas.microsoft.com/office/drawing/2010/main" w="9525">
                   <a:solidFill>
                     <a:srgbClr val="000000"/>
                   </a:solidFill>
@@ -3742,7 +3748,7 @@
             </a:ln>
             <a:extLst>
               <a:ext uri="{91240B29-F687-4f45-9708-019B960494DF}">
-                <a14:hiddenLine xmlns:a14="http://schemas.microsoft.com/office/drawing/2010/main" xmlns="" w="9525">
+                <a14:hiddenLine xmlns="" xmlns:a14="http://schemas.microsoft.com/office/drawing/2010/main" w="9525">
                   <a:solidFill>
                     <a:srgbClr val="000000"/>
                   </a:solidFill>
@@ -3832,7 +3838,7 @@
             </a:ln>
             <a:extLst>
               <a:ext uri="{91240B29-F687-4f45-9708-019B960494DF}">
-                <a14:hiddenLine xmlns:a14="http://schemas.microsoft.com/office/drawing/2010/main" xmlns="" w="9525">
+                <a14:hiddenLine xmlns="" xmlns:a14="http://schemas.microsoft.com/office/drawing/2010/main" w="9525">
                   <a:solidFill>
                     <a:srgbClr val="000000"/>
                   </a:solidFill>
@@ -3894,7 +3900,7 @@
             </a:ln>
             <a:extLst>
               <a:ext uri="{91240B29-F687-4f45-9708-019B960494DF}">
-                <a14:hiddenLine xmlns:a14="http://schemas.microsoft.com/office/drawing/2010/main" xmlns="" w="9525">
+                <a14:hiddenLine xmlns="" xmlns:a14="http://schemas.microsoft.com/office/drawing/2010/main" w="9525">
                   <a:solidFill>
                     <a:srgbClr val="000000"/>
                   </a:solidFill>
@@ -3984,7 +3990,7 @@
             </a:ln>
             <a:extLst>
               <a:ext uri="{91240B29-F687-4f45-9708-019B960494DF}">
-                <a14:hiddenLine xmlns:a14="http://schemas.microsoft.com/office/drawing/2010/main" xmlns="" w="9525">
+                <a14:hiddenLine xmlns="" xmlns:a14="http://schemas.microsoft.com/office/drawing/2010/main" w="9525">
                   <a:solidFill>
                     <a:srgbClr val="000000"/>
                   </a:solidFill>
@@ -4074,7 +4080,7 @@
             </a:ln>
             <a:extLst>
               <a:ext uri="{91240B29-F687-4f45-9708-019B960494DF}">
-                <a14:hiddenLine xmlns:a14="http://schemas.microsoft.com/office/drawing/2010/main" xmlns="" w="9525">
+                <a14:hiddenLine xmlns="" xmlns:a14="http://schemas.microsoft.com/office/drawing/2010/main" w="9525">
                   <a:solidFill>
                     <a:srgbClr val="000000"/>
                   </a:solidFill>
@@ -4139,7 +4145,7 @@
             </a:ln>
             <a:extLst>
               <a:ext uri="{91240B29-F687-4f45-9708-019B960494DF}">
-                <a14:hiddenLine xmlns:a14="http://schemas.microsoft.com/office/drawing/2010/main" xmlns="" w="9525">
+                <a14:hiddenLine xmlns="" xmlns:a14="http://schemas.microsoft.com/office/drawing/2010/main" w="9525">
                   <a:solidFill>
                     <a:srgbClr val="000000"/>
                   </a:solidFill>
@@ -4201,7 +4207,7 @@
             </a:ln>
             <a:extLst>
               <a:ext uri="{91240B29-F687-4f45-9708-019B960494DF}">
-                <a14:hiddenLine xmlns:a14="http://schemas.microsoft.com/office/drawing/2010/main" xmlns="" w="9525">
+                <a14:hiddenLine xmlns="" xmlns:a14="http://schemas.microsoft.com/office/drawing/2010/main" w="9525">
                   <a:solidFill>
                     <a:srgbClr val="000000"/>
                   </a:solidFill>
@@ -4291,7 +4297,7 @@
             </a:ln>
             <a:extLst>
               <a:ext uri="{91240B29-F687-4f45-9708-019B960494DF}">
-                <a14:hiddenLine xmlns:a14="http://schemas.microsoft.com/office/drawing/2010/main" xmlns="" w="9525">
+                <a14:hiddenLine xmlns="" xmlns:a14="http://schemas.microsoft.com/office/drawing/2010/main" w="9525">
                   <a:solidFill>
                     <a:srgbClr val="000000"/>
                   </a:solidFill>
@@ -4381,7 +4387,7 @@
             </a:ln>
             <a:extLst>
               <a:ext uri="{91240B29-F687-4f45-9708-019B960494DF}">
-                <a14:hiddenLine xmlns:a14="http://schemas.microsoft.com/office/drawing/2010/main" xmlns="" w="9525">
+                <a14:hiddenLine xmlns="" xmlns:a14="http://schemas.microsoft.com/office/drawing/2010/main" w="9525">
                   <a:solidFill>
                     <a:srgbClr val="000000"/>
                   </a:solidFill>
@@ -4443,7 +4449,7 @@
             </a:ln>
             <a:extLst>
               <a:ext uri="{91240B29-F687-4f45-9708-019B960494DF}">
-                <a14:hiddenLine xmlns:a14="http://schemas.microsoft.com/office/drawing/2010/main" xmlns="" w="9525">
+                <a14:hiddenLine xmlns="" xmlns:a14="http://schemas.microsoft.com/office/drawing/2010/main" w="9525">
                   <a:solidFill>
                     <a:srgbClr val="000000"/>
                   </a:solidFill>
@@ -4563,7 +4569,7 @@
             </a:ln>
             <a:extLst>
               <a:ext uri="{91240B29-F687-4f45-9708-019B960494DF}">
-                <a14:hiddenLine xmlns:a14="http://schemas.microsoft.com/office/drawing/2010/main" xmlns="" w="9525">
+                <a14:hiddenLine xmlns="" xmlns:a14="http://schemas.microsoft.com/office/drawing/2010/main" w="9525">
                   <a:solidFill>
                     <a:srgbClr val="000000"/>
                   </a:solidFill>
@@ -4631,7 +4637,7 @@
             </a:ln>
             <a:extLst>
               <a:ext uri="{91240B29-F687-4f45-9708-019B960494DF}">
-                <a14:hiddenLine xmlns:a14="http://schemas.microsoft.com/office/drawing/2010/main" xmlns="" w="9525">
+                <a14:hiddenLine xmlns="" xmlns:a14="http://schemas.microsoft.com/office/drawing/2010/main" w="9525">
                   <a:solidFill>
                     <a:srgbClr val="000000"/>
                   </a:solidFill>
@@ -4721,7 +4727,7 @@
             </a:ln>
             <a:extLst>
               <a:ext uri="{91240B29-F687-4f45-9708-019B960494DF}">
-                <a14:hiddenLine xmlns:a14="http://schemas.microsoft.com/office/drawing/2010/main" xmlns="" w="9525">
+                <a14:hiddenLine xmlns="" xmlns:a14="http://schemas.microsoft.com/office/drawing/2010/main" w="9525">
                   <a:solidFill>
                     <a:srgbClr val="000000"/>
                   </a:solidFill>
@@ -9438,7 +9444,7 @@
           <a:noFill/>
           <a:extLst>
             <a:ext uri="{909E8E84-426E-40dd-AFC4-6F175D3DCCD1}">
-              <a14:hiddenFill xmlns:a14="http://schemas.microsoft.com/office/drawing/2010/main" xmlns="">
+              <a14:hiddenFill xmlns="" xmlns:a14="http://schemas.microsoft.com/office/drawing/2010/main">
                 <a:solidFill>
                   <a:srgbClr val="FFFFFF"/>
                 </a:solidFill>
@@ -9512,7 +9518,7 @@
               </a:ln>
               <a:extLst>
                 <a:ext uri="{91240B29-F687-4f45-9708-019B960494DF}">
-                  <a14:hiddenLine xmlns:a14="http://schemas.microsoft.com/office/drawing/2010/main" xmlns="" w="9525">
+                  <a14:hiddenLine xmlns="" xmlns:a14="http://schemas.microsoft.com/office/drawing/2010/main" w="9525">
                     <a:solidFill>
                       <a:srgbClr val="000000"/>
                     </a:solidFill>
@@ -9602,7 +9608,7 @@
               </a:ln>
               <a:extLst>
                 <a:ext uri="{91240B29-F687-4f45-9708-019B960494DF}">
-                  <a14:hiddenLine xmlns:a14="http://schemas.microsoft.com/office/drawing/2010/main" xmlns="" w="9525">
+                  <a14:hiddenLine xmlns="" xmlns:a14="http://schemas.microsoft.com/office/drawing/2010/main" w="9525">
                     <a:solidFill>
                       <a:srgbClr val="000000"/>
                     </a:solidFill>
@@ -9692,7 +9698,7 @@
               </a:ln>
               <a:extLst>
                 <a:ext uri="{91240B29-F687-4f45-9708-019B960494DF}">
-                  <a14:hiddenLine xmlns:a14="http://schemas.microsoft.com/office/drawing/2010/main" xmlns="" w="9525">
+                  <a14:hiddenLine xmlns="" xmlns:a14="http://schemas.microsoft.com/office/drawing/2010/main" w="9525">
                     <a:solidFill>
                       <a:srgbClr val="000000"/>
                     </a:solidFill>
@@ -9754,7 +9760,7 @@
               </a:ln>
               <a:extLst>
                 <a:ext uri="{91240B29-F687-4f45-9708-019B960494DF}">
-                  <a14:hiddenLine xmlns:a14="http://schemas.microsoft.com/office/drawing/2010/main" xmlns="" w="9525">
+                  <a14:hiddenLine xmlns="" xmlns:a14="http://schemas.microsoft.com/office/drawing/2010/main" w="9525">
                     <a:solidFill>
                       <a:srgbClr val="000000"/>
                     </a:solidFill>
@@ -9844,7 +9850,7 @@
               </a:ln>
               <a:extLst>
                 <a:ext uri="{91240B29-F687-4f45-9708-019B960494DF}">
-                  <a14:hiddenLine xmlns:a14="http://schemas.microsoft.com/office/drawing/2010/main" xmlns="" w="9525">
+                  <a14:hiddenLine xmlns="" xmlns:a14="http://schemas.microsoft.com/office/drawing/2010/main" w="9525">
                     <a:solidFill>
                       <a:srgbClr val="000000"/>
                     </a:solidFill>
@@ -9906,7 +9912,7 @@
               </a:ln>
               <a:extLst>
                 <a:ext uri="{91240B29-F687-4f45-9708-019B960494DF}">
-                  <a14:hiddenLine xmlns:a14="http://schemas.microsoft.com/office/drawing/2010/main" xmlns="" w="9525">
+                  <a14:hiddenLine xmlns="" xmlns:a14="http://schemas.microsoft.com/office/drawing/2010/main" w="9525">
                     <a:solidFill>
                       <a:srgbClr val="000000"/>
                     </a:solidFill>
@@ -9968,7 +9974,7 @@
               </a:ln>
               <a:extLst>
                 <a:ext uri="{91240B29-F687-4f45-9708-019B960494DF}">
-                  <a14:hiddenLine xmlns:a14="http://schemas.microsoft.com/office/drawing/2010/main" xmlns="" w="9525">
+                  <a14:hiddenLine xmlns="" xmlns:a14="http://schemas.microsoft.com/office/drawing/2010/main" w="9525">
                     <a:solidFill>
                       <a:srgbClr val="000000"/>
                     </a:solidFill>
@@ -10058,7 +10064,7 @@
               </a:ln>
               <a:extLst>
                 <a:ext uri="{91240B29-F687-4f45-9708-019B960494DF}">
-                  <a14:hiddenLine xmlns:a14="http://schemas.microsoft.com/office/drawing/2010/main" xmlns="" w="9525">
+                  <a14:hiddenLine xmlns="" xmlns:a14="http://schemas.microsoft.com/office/drawing/2010/main" w="9525">
                     <a:solidFill>
                       <a:srgbClr val="000000"/>
                     </a:solidFill>
@@ -10148,7 +10154,7 @@
               </a:ln>
               <a:extLst>
                 <a:ext uri="{91240B29-F687-4f45-9708-019B960494DF}">
-                  <a14:hiddenLine xmlns:a14="http://schemas.microsoft.com/office/drawing/2010/main" xmlns="" w="9525">
+                  <a14:hiddenLine xmlns="" xmlns:a14="http://schemas.microsoft.com/office/drawing/2010/main" w="9525">
                     <a:solidFill>
                       <a:srgbClr val="000000"/>
                     </a:solidFill>
@@ -10210,7 +10216,7 @@
               </a:ln>
               <a:extLst>
                 <a:ext uri="{91240B29-F687-4f45-9708-019B960494DF}">
-                  <a14:hiddenLine xmlns:a14="http://schemas.microsoft.com/office/drawing/2010/main" xmlns="" w="9525">
+                  <a14:hiddenLine xmlns="" xmlns:a14="http://schemas.microsoft.com/office/drawing/2010/main" w="9525">
                     <a:solidFill>
                       <a:srgbClr val="000000"/>
                     </a:solidFill>
@@ -10320,7 +10326,7 @@
               </a:ln>
               <a:extLst>
                 <a:ext uri="{91240B29-F687-4f45-9708-019B960494DF}">
-                  <a14:hiddenLine xmlns:a14="http://schemas.microsoft.com/office/drawing/2010/main" xmlns="" w="9525">
+                  <a14:hiddenLine xmlns="" xmlns:a14="http://schemas.microsoft.com/office/drawing/2010/main" w="9525">
                     <a:solidFill>
                       <a:srgbClr val="000000"/>
                     </a:solidFill>
@@ -10404,7 +10410,7 @@
               </a:ln>
               <a:extLst>
                 <a:ext uri="{91240B29-F687-4f45-9708-019B960494DF}">
-                  <a14:hiddenLine xmlns:a14="http://schemas.microsoft.com/office/drawing/2010/main" xmlns="" w="9525">
+                  <a14:hiddenLine xmlns="" xmlns:a14="http://schemas.microsoft.com/office/drawing/2010/main" w="9525">
                     <a:solidFill>
                       <a:srgbClr val="000000"/>
                     </a:solidFill>
@@ -10466,7 +10472,7 @@
               </a:ln>
               <a:extLst>
                 <a:ext uri="{91240B29-F687-4f45-9708-019B960494DF}">
-                  <a14:hiddenLine xmlns:a14="http://schemas.microsoft.com/office/drawing/2010/main" xmlns="" w="9525">
+                  <a14:hiddenLine xmlns="" xmlns:a14="http://schemas.microsoft.com/office/drawing/2010/main" w="9525">
                     <a:solidFill>
                       <a:srgbClr val="000000"/>
                     </a:solidFill>
@@ -10528,7 +10534,7 @@
               </a:ln>
               <a:extLst>
                 <a:ext uri="{91240B29-F687-4f45-9708-019B960494DF}">
-                  <a14:hiddenLine xmlns:a14="http://schemas.microsoft.com/office/drawing/2010/main" xmlns="" w="9525">
+                  <a14:hiddenLine xmlns="" xmlns:a14="http://schemas.microsoft.com/office/drawing/2010/main" w="9525">
                     <a:solidFill>
                       <a:srgbClr val="000000"/>
                     </a:solidFill>
@@ -10618,7 +10624,7 @@
               </a:ln>
               <a:extLst>
                 <a:ext uri="{91240B29-F687-4f45-9708-019B960494DF}">
-                  <a14:hiddenLine xmlns:a14="http://schemas.microsoft.com/office/drawing/2010/main" xmlns="" w="9525">
+                  <a14:hiddenLine xmlns="" xmlns:a14="http://schemas.microsoft.com/office/drawing/2010/main" w="9525">
                     <a:solidFill>
                       <a:srgbClr val="000000"/>
                     </a:solidFill>
@@ -10652,7 +10658,7 @@
               </a:ln>
               <a:extLst>
                 <a:ext uri="{91240B29-F687-4f45-9708-019B960494DF}">
-                  <a14:hiddenLine xmlns:a14="http://schemas.microsoft.com/office/drawing/2010/main" xmlns="" w="9525">
+                  <a14:hiddenLine xmlns="" xmlns:a14="http://schemas.microsoft.com/office/drawing/2010/main" w="9525">
                     <a:solidFill>
                       <a:srgbClr val="000000"/>
                     </a:solidFill>
@@ -10717,7 +10723,7 @@
               </a:ln>
               <a:extLst>
                 <a:ext uri="{91240B29-F687-4f45-9708-019B960494DF}">
-                  <a14:hiddenLine xmlns:a14="http://schemas.microsoft.com/office/drawing/2010/main" xmlns="" w="9525">
+                  <a14:hiddenLine xmlns="" xmlns:a14="http://schemas.microsoft.com/office/drawing/2010/main" w="9525">
                     <a:solidFill>
                       <a:srgbClr val="000000"/>
                     </a:solidFill>
@@ -10807,7 +10813,7 @@
               </a:ln>
               <a:extLst>
                 <a:ext uri="{91240B29-F687-4f45-9708-019B960494DF}">
-                  <a14:hiddenLine xmlns:a14="http://schemas.microsoft.com/office/drawing/2010/main" xmlns="" w="9525">
+                  <a14:hiddenLine xmlns="" xmlns:a14="http://schemas.microsoft.com/office/drawing/2010/main" w="9525">
                     <a:solidFill>
                       <a:srgbClr val="000000"/>
                     </a:solidFill>
@@ -10869,7 +10875,7 @@
               </a:ln>
               <a:extLst>
                 <a:ext uri="{91240B29-F687-4f45-9708-019B960494DF}">
-                  <a14:hiddenLine xmlns:a14="http://schemas.microsoft.com/office/drawing/2010/main" xmlns="" w="9525">
+                  <a14:hiddenLine xmlns="" xmlns:a14="http://schemas.microsoft.com/office/drawing/2010/main" w="9525">
                     <a:solidFill>
                       <a:srgbClr val="000000"/>
                     </a:solidFill>
@@ -10959,7 +10965,7 @@
               </a:ln>
               <a:extLst>
                 <a:ext uri="{91240B29-F687-4f45-9708-019B960494DF}">
-                  <a14:hiddenLine xmlns:a14="http://schemas.microsoft.com/office/drawing/2010/main" xmlns="" w="9525">
+                  <a14:hiddenLine xmlns="" xmlns:a14="http://schemas.microsoft.com/office/drawing/2010/main" w="9525">
                     <a:solidFill>
                       <a:srgbClr val="000000"/>
                     </a:solidFill>
@@ -11024,7 +11030,7 @@
               </a:ln>
               <a:extLst>
                 <a:ext uri="{91240B29-F687-4f45-9708-019B960494DF}">
-                  <a14:hiddenLine xmlns:a14="http://schemas.microsoft.com/office/drawing/2010/main" xmlns="" w="9525">
+                  <a14:hiddenLine xmlns="" xmlns:a14="http://schemas.microsoft.com/office/drawing/2010/main" w="9525">
                     <a:solidFill>
                       <a:srgbClr val="000000"/>
                     </a:solidFill>
@@ -11086,7 +11092,7 @@
               </a:ln>
               <a:extLst>
                 <a:ext uri="{91240B29-F687-4f45-9708-019B960494DF}">
-                  <a14:hiddenLine xmlns:a14="http://schemas.microsoft.com/office/drawing/2010/main" xmlns="" w="9525">
+                  <a14:hiddenLine xmlns="" xmlns:a14="http://schemas.microsoft.com/office/drawing/2010/main" w="9525">
                     <a:solidFill>
                       <a:srgbClr val="000000"/>
                     </a:solidFill>
@@ -11176,7 +11182,7 @@
               </a:ln>
               <a:extLst>
                 <a:ext uri="{91240B29-F687-4f45-9708-019B960494DF}">
-                  <a14:hiddenLine xmlns:a14="http://schemas.microsoft.com/office/drawing/2010/main" xmlns="" w="9525">
+                  <a14:hiddenLine xmlns="" xmlns:a14="http://schemas.microsoft.com/office/drawing/2010/main" w="9525">
                     <a:solidFill>
                       <a:srgbClr val="000000"/>
                     </a:solidFill>
@@ -11266,7 +11272,7 @@
               </a:ln>
               <a:extLst>
                 <a:ext uri="{91240B29-F687-4f45-9708-019B960494DF}">
-                  <a14:hiddenLine xmlns:a14="http://schemas.microsoft.com/office/drawing/2010/main" xmlns="" w="9525">
+                  <a14:hiddenLine xmlns="" xmlns:a14="http://schemas.microsoft.com/office/drawing/2010/main" w="9525">
                     <a:solidFill>
                       <a:srgbClr val="000000"/>
                     </a:solidFill>
@@ -11331,7 +11337,7 @@
               </a:ln>
               <a:extLst>
                 <a:ext uri="{91240B29-F687-4f45-9708-019B960494DF}">
-                  <a14:hiddenLine xmlns:a14="http://schemas.microsoft.com/office/drawing/2010/main" xmlns="" w="9525">
+                  <a14:hiddenLine xmlns="" xmlns:a14="http://schemas.microsoft.com/office/drawing/2010/main" w="9525">
                     <a:solidFill>
                       <a:srgbClr val="000000"/>
                     </a:solidFill>
@@ -11451,7 +11457,7 @@
               </a:ln>
               <a:extLst>
                 <a:ext uri="{91240B29-F687-4f45-9708-019B960494DF}">
-                  <a14:hiddenLine xmlns:a14="http://schemas.microsoft.com/office/drawing/2010/main" xmlns="" w="9525">
+                  <a14:hiddenLine xmlns="" xmlns:a14="http://schemas.microsoft.com/office/drawing/2010/main" w="9525">
                     <a:solidFill>
                       <a:srgbClr val="000000"/>
                     </a:solidFill>
@@ -11549,7 +11555,7 @@
               </a:ln>
               <a:extLst>
                 <a:ext uri="{91240B29-F687-4f45-9708-019B960494DF}">
-                  <a14:hiddenLine xmlns:a14="http://schemas.microsoft.com/office/drawing/2010/main" xmlns="" w="9525">
+                  <a14:hiddenLine xmlns="" xmlns:a14="http://schemas.microsoft.com/office/drawing/2010/main" w="9525">
                     <a:solidFill>
                       <a:srgbClr val="000000"/>
                     </a:solidFill>
@@ -11664,7 +11670,7 @@
               </a:ln>
               <a:extLst>
                 <a:ext uri="{91240B29-F687-4f45-9708-019B960494DF}">
-                  <a14:hiddenLine xmlns:a14="http://schemas.microsoft.com/office/drawing/2010/main" xmlns="" w="9525">
+                  <a14:hiddenLine xmlns="" xmlns:a14="http://schemas.microsoft.com/office/drawing/2010/main" w="9525">
                     <a:solidFill>
                       <a:srgbClr val="000000"/>
                     </a:solidFill>
@@ -11754,7 +11760,7 @@
               </a:ln>
               <a:extLst>
                 <a:ext uri="{91240B29-F687-4f45-9708-019B960494DF}">
-                  <a14:hiddenLine xmlns:a14="http://schemas.microsoft.com/office/drawing/2010/main" xmlns="" w="9525">
+                  <a14:hiddenLine xmlns="" xmlns:a14="http://schemas.microsoft.com/office/drawing/2010/main" w="9525">
                     <a:solidFill>
                       <a:srgbClr val="000000"/>
                     </a:solidFill>
@@ -11819,7 +11825,7 @@
               </a:ln>
               <a:extLst>
                 <a:ext uri="{91240B29-F687-4f45-9708-019B960494DF}">
-                  <a14:hiddenLine xmlns:a14="http://schemas.microsoft.com/office/drawing/2010/main" xmlns="" w="9525">
+                  <a14:hiddenLine xmlns="" xmlns:a14="http://schemas.microsoft.com/office/drawing/2010/main" w="9525">
                     <a:solidFill>
                       <a:srgbClr val="000000"/>
                     </a:solidFill>
@@ -11909,7 +11915,7 @@
               </a:ln>
               <a:extLst>
                 <a:ext uri="{91240B29-F687-4f45-9708-019B960494DF}">
-                  <a14:hiddenLine xmlns:a14="http://schemas.microsoft.com/office/drawing/2010/main" xmlns="" w="9525">
+                  <a14:hiddenLine xmlns="" xmlns:a14="http://schemas.microsoft.com/office/drawing/2010/main" w="9525">
                     <a:solidFill>
                       <a:srgbClr val="000000"/>
                     </a:solidFill>
@@ -11977,7 +11983,7 @@
               </a:ln>
               <a:extLst>
                 <a:ext uri="{91240B29-F687-4f45-9708-019B960494DF}">
-                  <a14:hiddenLine xmlns:a14="http://schemas.microsoft.com/office/drawing/2010/main" xmlns="" w="9525">
+                  <a14:hiddenLine xmlns="" xmlns:a14="http://schemas.microsoft.com/office/drawing/2010/main" w="9525">
                     <a:solidFill>
                       <a:srgbClr val="000000"/>
                     </a:solidFill>
@@ -12067,7 +12073,7 @@
               </a:ln>
               <a:extLst>
                 <a:ext uri="{91240B29-F687-4f45-9708-019B960494DF}">
-                  <a14:hiddenLine xmlns:a14="http://schemas.microsoft.com/office/drawing/2010/main" xmlns="" w="9525">
+                  <a14:hiddenLine xmlns="" xmlns:a14="http://schemas.microsoft.com/office/drawing/2010/main" w="9525">
                     <a:solidFill>
                       <a:srgbClr val="000000"/>
                     </a:solidFill>
@@ -12135,7 +12141,7 @@
               </a:ln>
               <a:extLst>
                 <a:ext uri="{91240B29-F687-4f45-9708-019B960494DF}">
-                  <a14:hiddenLine xmlns:a14="http://schemas.microsoft.com/office/drawing/2010/main" xmlns="" w="9525">
+                  <a14:hiddenLine xmlns="" xmlns:a14="http://schemas.microsoft.com/office/drawing/2010/main" w="9525">
                     <a:solidFill>
                       <a:srgbClr val="000000"/>
                     </a:solidFill>
@@ -12225,7 +12231,7 @@
               </a:ln>
               <a:extLst>
                 <a:ext uri="{91240B29-F687-4f45-9708-019B960494DF}">
-                  <a14:hiddenLine xmlns:a14="http://schemas.microsoft.com/office/drawing/2010/main" xmlns="" w="9525">
+                  <a14:hiddenLine xmlns="" xmlns:a14="http://schemas.microsoft.com/office/drawing/2010/main" w="9525">
                     <a:solidFill>
                       <a:srgbClr val="000000"/>
                     </a:solidFill>
@@ -12259,7 +12265,7 @@
               </a:ln>
               <a:extLst>
                 <a:ext uri="{91240B29-F687-4f45-9708-019B960494DF}">
-                  <a14:hiddenLine xmlns:a14="http://schemas.microsoft.com/office/drawing/2010/main" xmlns="" w="9525">
+                  <a14:hiddenLine xmlns="" xmlns:a14="http://schemas.microsoft.com/office/drawing/2010/main" w="9525">
                     <a:solidFill>
                       <a:srgbClr val="000000"/>
                     </a:solidFill>
@@ -12840,7 +12846,7 @@
         </p:spPr>
         <p:txBody>
           <a:bodyPr>
-            <a:normAutofit/>
+            <a:normAutofit fontScale="90000"/>
           </a:bodyPr>
           <a:lstStyle/>
           <a:p>
@@ -12853,7 +12859,7 @@
             </a:br>
             <a:r>
               <a:rPr lang="en-US" dirty="0"/>
-              <a:t>on-chain (live) professional certificate verification</a:t>
+              <a:t>on-chain (main net) professional certificate verification</a:t>
             </a:r>
           </a:p>
         </p:txBody>
@@ -12985,13 +12991,13 @@
   <p:clrMapOvr>
     <a:masterClrMapping/>
   </p:clrMapOvr>
-  <mc:AlternateContent xmlns:mc="http://schemas.openxmlformats.org/markup-compatibility/2006">
-    <mc:Choice xmlns:p14="http://schemas.microsoft.com/office/powerpoint/2010/main" Requires="p14">
+  <mc:AlternateContent xmlns:mc="http://schemas.openxmlformats.org/markup-compatibility/2006" xmlns:p14="http://schemas.microsoft.com/office/powerpoint/2010/main">
+    <mc:Choice Requires="p14">
       <p:transition spd="med" p14:dur="700" advClick="0" advTm="15000">
         <p:fade/>
       </p:transition>
     </mc:Choice>
-    <mc:Fallback>
+    <mc:Fallback xmlns="">
       <p:transition spd="med" advClick="0" advTm="15000">
         <p:fade/>
       </p:transition>
@@ -13771,6 +13777,212 @@
           <p:cNvPr id="2" name="Title 1">
             <a:extLst>
               <a:ext uri="{FF2B5EF4-FFF2-40B4-BE49-F238E27FC236}">
+                <a16:creationId xmlns:a16="http://schemas.microsoft.com/office/drawing/2014/main" id="{5F8646EA-1E67-FE4A-A7D3-0D7B9A193A10}"/>
+              </a:ext>
+            </a:extLst>
+          </p:cNvPr>
+          <p:cNvSpPr>
+            <a:spLocks noGrp="1"/>
+          </p:cNvSpPr>
+          <p:nvPr>
+            <p:ph type="title"/>
+          </p:nvPr>
+        </p:nvSpPr>
+        <p:spPr/>
+        <p:txBody>
+          <a:bodyPr/>
+          <a:lstStyle/>
+          <a:p>
+            <a:r>
+              <a:rPr lang="en-US" dirty="0"/>
+              <a:t>Cost to deploy on main</a:t>
+            </a:r>
+          </a:p>
+        </p:txBody>
+      </p:sp>
+      <p:sp>
+        <p:nvSpPr>
+          <p:cNvPr id="3" name="Content Placeholder 2">
+            <a:extLst>
+              <a:ext uri="{FF2B5EF4-FFF2-40B4-BE49-F238E27FC236}">
+                <a16:creationId xmlns:a16="http://schemas.microsoft.com/office/drawing/2014/main" id="{20FAC294-F3EF-F145-9905-A3D2E15109EE}"/>
+              </a:ext>
+            </a:extLst>
+          </p:cNvPr>
+          <p:cNvSpPr>
+            <a:spLocks noGrp="1"/>
+          </p:cNvSpPr>
+          <p:nvPr>
+            <p:ph idx="1"/>
+          </p:nvPr>
+        </p:nvSpPr>
+        <p:spPr/>
+        <p:txBody>
+          <a:bodyPr>
+            <a:normAutofit fontScale="85000" lnSpcReduction="20000"/>
+          </a:bodyPr>
+          <a:lstStyle/>
+          <a:p>
+            <a:r>
+              <a:rPr lang="en-US" dirty="0"/>
+              <a:t>Cost to create contract:</a:t>
+            </a:r>
+          </a:p>
+          <a:p>
+            <a:pPr lvl="1"/>
+            <a:r>
+              <a:rPr lang="en-US" dirty="0"/>
+              <a:t>0</a:t>
+            </a:r>
+            <a:r>
+              <a:rPr lang="en-US" b="1" dirty="0"/>
+              <a:t>.</a:t>
+            </a:r>
+            <a:r>
+              <a:rPr lang="en-US" dirty="0"/>
+              <a:t>05208362 Ether ($6.49) </a:t>
+            </a:r>
+          </a:p>
+          <a:p>
+            <a:r>
+              <a:rPr lang="en-US" dirty="0"/>
+              <a:t>Cost to mint a token: </a:t>
+            </a:r>
+          </a:p>
+          <a:p>
+            <a:pPr lvl="1"/>
+            <a:r>
+              <a:rPr lang="en-US" dirty="0"/>
+              <a:t>0</a:t>
+            </a:r>
+            <a:r>
+              <a:rPr lang="en-US" b="1" dirty="0"/>
+              <a:t>.</a:t>
+            </a:r>
+            <a:r>
+              <a:rPr lang="en-US" dirty="0"/>
+              <a:t>00362982 Ether ($0.45)</a:t>
+            </a:r>
+          </a:p>
+          <a:p>
+            <a:pPr marL="0" indent="0">
+              <a:buNone/>
+            </a:pPr>
+            <a:endParaRPr lang="en-US" dirty="0"/>
+          </a:p>
+          <a:p>
+            <a:r>
+              <a:rPr lang="en-US" sz="3900" dirty="0"/>
+              <a:t>1</a:t>
+            </a:r>
+            <a:r>
+              <a:rPr lang="en-US" sz="3900" baseline="30000" dirty="0"/>
+              <a:t>st</a:t>
+            </a:r>
+            <a:r>
+              <a:rPr lang="en-US" sz="3900" dirty="0"/>
+              <a:t> Class Post Office Rate ($0.49)</a:t>
+            </a:r>
+          </a:p>
+          <a:p>
+            <a:endParaRPr lang="en-US" sz="2000" dirty="0"/>
+          </a:p>
+          <a:p>
+            <a:r>
+              <a:rPr lang="en-US" sz="2000" dirty="0">
+                <a:hlinkClick r:id="rId2"/>
+              </a:rPr>
+              <a:t>https://etherscan.io/address/0x86488654b8a318870b9d1efa7b23fc97503e8589</a:t>
+            </a:r>
+            <a:endParaRPr lang="en-US" sz="2000" dirty="0"/>
+          </a:p>
+          <a:p>
+            <a:endParaRPr lang="en-US" sz="2000" dirty="0"/>
+          </a:p>
+        </p:txBody>
+      </p:sp>
+      <p:pic>
+        <p:nvPicPr>
+          <p:cNvPr id="1026" name="Picture 2" descr="Image result for bitcoin mouth emoji">
+            <a:extLst>
+              <a:ext uri="{FF2B5EF4-FFF2-40B4-BE49-F238E27FC236}">
+                <a16:creationId xmlns:a16="http://schemas.microsoft.com/office/drawing/2014/main" id="{8AE34BCE-770A-9841-BC25-3440EAF629CC}"/>
+              </a:ext>
+            </a:extLst>
+          </p:cNvPr>
+          <p:cNvPicPr>
+            <a:picLocks noChangeAspect="1" noChangeArrowheads="1"/>
+          </p:cNvPicPr>
+          <p:nvPr/>
+        </p:nvPicPr>
+        <p:blipFill>
+          <a:blip r:embed="rId3">
+            <a:extLst>
+              <a:ext uri="{28A0092B-C50C-407E-A947-70E740481C1C}">
+                <a14:useLocalDpi xmlns:a14="http://schemas.microsoft.com/office/drawing/2010/main" val="0"/>
+              </a:ext>
+            </a:extLst>
+          </a:blip>
+          <a:srcRect/>
+          <a:stretch>
+            <a:fillRect/>
+          </a:stretch>
+        </p:blipFill>
+        <p:spPr bwMode="auto">
+          <a:xfrm>
+            <a:off x="8748592" y="1357803"/>
+            <a:ext cx="2298819" cy="2446637"/>
+          </a:xfrm>
+          <a:prstGeom prst="rect">
+            <a:avLst/>
+          </a:prstGeom>
+          <a:noFill/>
+          <a:extLst>
+            <a:ext uri="{909E8E84-426E-40DD-AFC4-6F175D3DCCD1}">
+              <a14:hiddenFill xmlns:a14="http://schemas.microsoft.com/office/drawing/2010/main">
+                <a:solidFill>
+                  <a:srgbClr val="FFFFFF"/>
+                </a:solidFill>
+              </a14:hiddenFill>
+            </a:ext>
+          </a:extLst>
+        </p:spPr>
+      </p:pic>
+    </p:spTree>
+    <p:extLst>
+      <p:ext uri="{BB962C8B-B14F-4D97-AF65-F5344CB8AC3E}">
+        <p14:creationId xmlns:p14="http://schemas.microsoft.com/office/powerpoint/2010/main" val="364571189"/>
+      </p:ext>
+    </p:extLst>
+  </p:cSld>
+  <p:clrMapOvr>
+    <a:masterClrMapping/>
+  </p:clrMapOvr>
+</p:sld>
+</file>
+
+<file path=ppt/slides/slide8.xml><?xml version="1.0" encoding="utf-8"?>
+<p:sld xmlns:a="http://schemas.openxmlformats.org/drawingml/2006/main" xmlns:r="http://schemas.openxmlformats.org/officeDocument/2006/relationships" xmlns:p="http://schemas.openxmlformats.org/presentationml/2006/main">
+  <p:cSld>
+    <p:spTree>
+      <p:nvGrpSpPr>
+        <p:cNvPr id="1" name=""/>
+        <p:cNvGrpSpPr/>
+        <p:nvPr/>
+      </p:nvGrpSpPr>
+      <p:grpSpPr>
+        <a:xfrm>
+          <a:off x="0" y="0"/>
+          <a:ext cx="0" cy="0"/>
+          <a:chOff x="0" y="0"/>
+          <a:chExt cx="0" cy="0"/>
+        </a:xfrm>
+      </p:grpSpPr>
+      <p:sp>
+        <p:nvSpPr>
+          <p:cNvPr id="2" name="Title 1">
+            <a:extLst>
+              <a:ext uri="{FF2B5EF4-FFF2-40B4-BE49-F238E27FC236}">
                 <a16:creationId xmlns:a16="http://schemas.microsoft.com/office/drawing/2014/main" id="{6BE24338-BE27-F54A-AC3A-02EFCB3D5584}"/>
               </a:ext>
             </a:extLst>
@@ -13810,7 +14022,12 @@
             <p:ph idx="1"/>
           </p:nvPr>
         </p:nvSpPr>
-        <p:spPr/>
+        <p:spPr>
+          <a:xfrm>
+            <a:off x="1141412" y="1923671"/>
+            <a:ext cx="9905999" cy="3541714"/>
+          </a:xfrm>
+        </p:spPr>
         <p:txBody>
           <a:bodyPr>
             <a:noAutofit/>
@@ -13829,7 +14046,7 @@
             <a:pPr lvl="1"/>
             <a:r>
               <a:rPr lang="en-US" dirty="0"/>
-              <a:t>You can go here!!</a:t>
+              <a:t>You can go here!! </a:t>
             </a:r>
           </a:p>
           <a:p>
@@ -13848,18 +14065,11 @@
               <a:rPr lang="en-US" dirty="0">
                 <a:hlinkClick r:id="rId3"/>
               </a:rPr>
-              <a:t>https://rinkeby.etherscan.io/address/0x95707d79e803c3ff32ecc0cf223af6416c2b90ad</a:t>
-            </a:r>
-            <a:r>
-              <a:rPr lang="en-US" dirty="0"/>
-              <a:t> 	</a:t>
-            </a:r>
-          </a:p>
-          <a:p>
-            <a:r>
-              <a:rPr lang="en-US" sz="2000" dirty="0"/>
-              <a:t>Sean’s MetaMask with BKP Tokens </a:t>
-            </a:r>
+              <a:t>https://etherscan.io/tx/0x66d5698a37f116d5716e0aaf95074e36e9764b7904f5c88dc11b31b5d8380dab</a:t>
+            </a:r>
+            <a:endParaRPr lang="en-US" dirty="0">
+              <a:hlinkClick r:id="rId4"/>
+            </a:endParaRPr>
           </a:p>
           <a:p>
             <a:pPr lvl="1"/>
@@ -13867,13 +14077,37 @@
               <a:rPr lang="en-US" dirty="0">
                 <a:hlinkClick r:id="rId4"/>
               </a:rPr>
-              <a:t>h</a:t>
+              <a:t>https://rinkeby.etherscan.io/address/0x95707d79e803c3ff32ecc0cf223af6416c2b90a</a:t>
             </a:r>
             <a:r>
               <a:rPr lang="en-US" dirty="0">
                 <a:hlinkClick r:id="rId4"/>
               </a:rPr>
-              <a:t>ttps://rinkeby.etherscan.io/token/0x95707d79e803c3ff32ecc0cf223af6416c2b90ad?a=0x41FF2c09C4fAE81267Bd4feA1814Bac711C19004</a:t>
+              <a:t>d</a:t>
+            </a:r>
+            <a:endParaRPr lang="en-US" dirty="0"/>
+          </a:p>
+          <a:p>
+            <a:r>
+              <a:rPr lang="en-US" sz="2000" dirty="0"/>
+              <a:t>Sean’s </a:t>
+            </a:r>
+            <a:r>
+              <a:rPr lang="en-US" sz="2000" dirty="0" err="1"/>
+              <a:t>BackPack</a:t>
+            </a:r>
+            <a:r>
+              <a:rPr lang="en-US" sz="2000" dirty="0"/>
+              <a:t> with BKP Tokens </a:t>
+            </a:r>
+          </a:p>
+          <a:p>
+            <a:pPr lvl="1"/>
+            <a:r>
+              <a:rPr lang="en-US" dirty="0">
+                <a:hlinkClick r:id="rId5"/>
+              </a:rPr>
+              <a:t>https://rinkeby.etherscan.io/token/0x95707d79e803c3ff32ecc0cf223af6416c2b90ad?a=0x41FF2c09C4fAE81267Bd4feA1814Bac711C19004</a:t>
             </a:r>
             <a:r>
               <a:rPr lang="en-US" dirty="0"/>
@@ -13895,7 +14129,7 @@
 </p:sld>
 </file>
 
-<file path=ppt/slides/slide8.xml><?xml version="1.0" encoding="utf-8"?>
+<file path=ppt/slides/slide9.xml><?xml version="1.0" encoding="utf-8"?>
 <p:sld xmlns:a="http://schemas.openxmlformats.org/drawingml/2006/main" xmlns:r="http://schemas.openxmlformats.org/officeDocument/2006/relationships" xmlns:p="http://schemas.openxmlformats.org/presentationml/2006/main">
   <p:cSld>
     <p:spTree>

</xml_diff>